<commit_message>
add improvements on the title with narrow scope of Banking sector in Tanzania
</commit_message>
<xml_diff>
--- a/PROPOSAL.pptx
+++ b/PROPOSAL.pptx
@@ -83,7 +83,7 @@
         <p:txBody>
           <a:bodyPr/>
           <a:p>
-            <a:fld id="{06E5C038-C196-4E58-A614-BD5209DDA547}" type="slidenum">
+            <a:fld id="{C636E468-3DE3-4FDD-AC23-D5623F05A5D3}" type="slidenum">
               <a:t>&lt;#&gt;</a:t>
             </a:fld>
           </a:p>
@@ -256,7 +256,7 @@
         <p:txBody>
           <a:bodyPr/>
           <a:p>
-            <a:fld id="{859D518E-674B-40E0-9CE8-CEE713CFCD7A}" type="slidenum">
+            <a:fld id="{B1DAC042-A3E1-4093-AD54-8FA9976FDBF5}" type="slidenum">
               <a:t>&lt;#&gt;</a:t>
             </a:fld>
           </a:p>
@@ -503,7 +503,7 @@
         <p:txBody>
           <a:bodyPr/>
           <a:p>
-            <a:fld id="{7C886117-0BFF-4D23-A0B5-85055D93CE5C}" type="slidenum">
+            <a:fld id="{9AA5876F-2684-46C0-A07F-6BCD20A49A34}" type="slidenum">
               <a:t>&lt;#&gt;</a:t>
             </a:fld>
           </a:p>
@@ -824,7 +824,7 @@
         <p:txBody>
           <a:bodyPr/>
           <a:p>
-            <a:fld id="{F8752CF4-F1C5-4227-B6A4-FD58E810831D}" type="slidenum">
+            <a:fld id="{2225E695-60BA-4FF9-80D7-A0225C68BB9C}" type="slidenum">
               <a:t>&lt;#&gt;</a:t>
             </a:fld>
           </a:p>
@@ -886,7 +886,7 @@
         <p:txBody>
           <a:bodyPr/>
           <a:p>
-            <a:fld id="{9EF3465D-223C-4348-8EF3-351D0E3AF3CE}" type="slidenum">
+            <a:fld id="{5E62F414-056B-4B86-A8F2-C70B3DF2BC3C}" type="slidenum">
               <a:t>&lt;#&gt;</a:t>
             </a:fld>
           </a:p>
@@ -1022,7 +1022,7 @@
         <p:txBody>
           <a:bodyPr/>
           <a:p>
-            <a:fld id="{CD952F15-8235-4633-8066-FDCF7CBAFCAE}" type="slidenum">
+            <a:fld id="{D52745D9-7C52-439F-896A-DF37A8058D14}" type="slidenum">
               <a:t>&lt;#&gt;</a:t>
             </a:fld>
           </a:p>
@@ -1158,7 +1158,7 @@
         <p:txBody>
           <a:bodyPr/>
           <a:p>
-            <a:fld id="{CCDEB544-EF3F-4697-B4CF-4354410EEB7C}" type="slidenum">
+            <a:fld id="{67ADFCAC-98AC-4B8B-B106-A7ED77439CA6}" type="slidenum">
               <a:t>&lt;#&gt;</a:t>
             </a:fld>
           </a:p>
@@ -1331,7 +1331,7 @@
         <p:txBody>
           <a:bodyPr/>
           <a:p>
-            <a:fld id="{CF923950-37FE-4BE1-B256-FB596DB838A5}" type="slidenum">
+            <a:fld id="{9C3E159D-D246-4975-958C-2453EAE43D0A}" type="slidenum">
               <a:t>&lt;#&gt;</a:t>
             </a:fld>
           </a:p>
@@ -1430,7 +1430,7 @@
         <p:txBody>
           <a:bodyPr/>
           <a:p>
-            <a:fld id="{6954E27B-FC14-4C46-AC94-DB9F19C3C390}" type="slidenum">
+            <a:fld id="{D443B784-C66A-4807-8DF5-A4B2ABD20CCC}" type="slidenum">
               <a:t>&lt;#&gt;</a:t>
             </a:fld>
           </a:p>
@@ -1529,7 +1529,7 @@
         <p:txBody>
           <a:bodyPr/>
           <a:p>
-            <a:fld id="{37A5215A-5A6F-45E5-B41E-73F639335842}" type="slidenum">
+            <a:fld id="{D15A834D-06A5-4B3E-BEE0-6CF6AB4D31EF}" type="slidenum">
               <a:t>&lt;#&gt;</a:t>
             </a:fld>
           </a:p>
@@ -1739,7 +1739,7 @@
         <p:txBody>
           <a:bodyPr/>
           <a:p>
-            <a:fld id="{B7B2431D-EECA-4B9F-AEDA-7C7CF4AD8E07}" type="slidenum">
+            <a:fld id="{539F432D-7A64-4F09-BA73-85D4F85F40F8}" type="slidenum">
               <a:t>&lt;#&gt;</a:t>
             </a:fld>
           </a:p>
@@ -1875,7 +1875,7 @@
         <p:txBody>
           <a:bodyPr/>
           <a:p>
-            <a:fld id="{51D7EFC6-171A-4D73-BC56-3408C398E6E0}" type="slidenum">
+            <a:fld id="{6DEEF206-B757-4B1B-8A23-A5DDF6FBC2E0}" type="slidenum">
               <a:t>&lt;#&gt;</a:t>
             </a:fld>
           </a:p>
@@ -2085,7 +2085,7 @@
         <p:txBody>
           <a:bodyPr/>
           <a:p>
-            <a:fld id="{92528751-5634-4E84-8AC4-FCD90B3F2D62}" type="slidenum">
+            <a:fld id="{C02B9C42-AB10-4726-9071-FBDD8BA4150C}" type="slidenum">
               <a:t>&lt;#&gt;</a:t>
             </a:fld>
           </a:p>
@@ -2295,7 +2295,7 @@
         <p:txBody>
           <a:bodyPr/>
           <a:p>
-            <a:fld id="{909FE3EE-D56E-41F0-B81A-EA8575294931}" type="slidenum">
+            <a:fld id="{99B0F480-EF5A-4EEF-B8C6-A9F6378867F9}" type="slidenum">
               <a:t>&lt;#&gt;</a:t>
             </a:fld>
           </a:p>
@@ -2468,7 +2468,7 @@
         <p:txBody>
           <a:bodyPr/>
           <a:p>
-            <a:fld id="{1C0C3174-937D-49B4-AC6B-60AAC2B60C7D}" type="slidenum">
+            <a:fld id="{D66B5D08-F4CD-4FA7-A2C2-684C11BCB866}" type="slidenum">
               <a:t>&lt;#&gt;</a:t>
             </a:fld>
           </a:p>
@@ -2715,7 +2715,7 @@
         <p:txBody>
           <a:bodyPr/>
           <a:p>
-            <a:fld id="{DB3AB35F-3DE7-408F-ACF7-712B0F8E6A6C}" type="slidenum">
+            <a:fld id="{CF37B6DD-1797-4A81-8F52-A9114A4582BF}" type="slidenum">
               <a:t>&lt;#&gt;</a:t>
             </a:fld>
           </a:p>
@@ -3036,7 +3036,7 @@
         <p:txBody>
           <a:bodyPr/>
           <a:p>
-            <a:fld id="{B2118A2A-EA1D-4EC5-AF3D-7F3802CA953B}" type="slidenum">
+            <a:fld id="{EA6A973B-52D6-494A-B1CF-6159FF0162A9}" type="slidenum">
               <a:t>&lt;#&gt;</a:t>
             </a:fld>
           </a:p>
@@ -3078,7 +3078,7 @@
         <p:txBody>
           <a:bodyPr/>
           <a:p>
-            <a:fld id="{90A62D85-0FFF-4E5E-8880-DDF393EE07A1}" type="slidenum">
+            <a:fld id="{4ED0FA6E-F281-43AB-8188-0EA8C095ED36}" type="slidenum">
               <a:t>&lt;#&gt;</a:t>
             </a:fld>
           </a:p>
@@ -3194,7 +3194,7 @@
         <p:txBody>
           <a:bodyPr/>
           <a:p>
-            <a:fld id="{70A74548-5FFA-4098-9383-F759FF93AED5}" type="slidenum">
+            <a:fld id="{AA44877F-C0A4-4B78-8D59-78588FCE0891}" type="slidenum">
               <a:t>&lt;#&gt;</a:t>
             </a:fld>
           </a:p>
@@ -3310,7 +3310,7 @@
         <p:txBody>
           <a:bodyPr/>
           <a:p>
-            <a:fld id="{DBAC54F4-CD8A-4E35-B24A-321B547A7B49}" type="slidenum">
+            <a:fld id="{CD5B689D-6D69-42B5-8280-E4897CBAC2C4}" type="slidenum">
               <a:t>&lt;#&gt;</a:t>
             </a:fld>
           </a:p>
@@ -3463,7 +3463,7 @@
         <p:txBody>
           <a:bodyPr/>
           <a:p>
-            <a:fld id="{FCD19D0C-86F6-48A5-83C8-3888FF5F896C}" type="slidenum">
+            <a:fld id="{22E2350A-367A-4186-96EA-2EB2E2CB4D52}" type="slidenum">
               <a:t>&lt;#&gt;</a:t>
             </a:fld>
           </a:p>
@@ -3542,7 +3542,7 @@
         <p:txBody>
           <a:bodyPr/>
           <a:p>
-            <a:fld id="{73D7BB58-CE9B-4CC5-9A50-BA0AE1D45F63}" type="slidenum">
+            <a:fld id="{913FD8E9-FEAC-4130-856C-DB86C600846F}" type="slidenum">
               <a:t>&lt;#&gt;</a:t>
             </a:fld>
           </a:p>
@@ -3678,7 +3678,7 @@
         <p:txBody>
           <a:bodyPr/>
           <a:p>
-            <a:fld id="{F51C01EE-B530-49E9-BD5D-AE37BB595E05}" type="slidenum">
+            <a:fld id="{A58E1CFC-ACDA-42AF-ABDB-3FE622329439}" type="slidenum">
               <a:t>&lt;#&gt;</a:t>
             </a:fld>
           </a:p>
@@ -3757,7 +3757,7 @@
         <p:txBody>
           <a:bodyPr/>
           <a:p>
-            <a:fld id="{D969104C-F697-40D4-826A-B9227633E3D0}" type="slidenum">
+            <a:fld id="{6676A66C-69CA-4A71-92A0-07E917443772}" type="slidenum">
               <a:t>&lt;#&gt;</a:t>
             </a:fld>
           </a:p>
@@ -3947,7 +3947,7 @@
         <p:txBody>
           <a:bodyPr/>
           <a:p>
-            <a:fld id="{1A452A2C-1888-4CE5-9CF8-FED6CCAAA114}" type="slidenum">
+            <a:fld id="{706B9FBA-3734-40BC-B349-C84C11B0401E}" type="slidenum">
               <a:t>&lt;#&gt;</a:t>
             </a:fld>
           </a:p>
@@ -4137,7 +4137,7 @@
         <p:txBody>
           <a:bodyPr/>
           <a:p>
-            <a:fld id="{2C529AEE-0690-4040-82EC-990BCA9C017F}" type="slidenum">
+            <a:fld id="{B4DE7E02-36D7-47A1-BD5C-AF07AF34AEC6}" type="slidenum">
               <a:t>&lt;#&gt;</a:t>
             </a:fld>
           </a:p>
@@ -4327,7 +4327,7 @@
         <p:txBody>
           <a:bodyPr/>
           <a:p>
-            <a:fld id="{4B9C0CBC-A1A4-489A-B2F1-2BE359EC7FE9}" type="slidenum">
+            <a:fld id="{E4034CFD-E2BC-4041-9D5F-46787E0E0D3F}" type="slidenum">
               <a:t>&lt;#&gt;</a:t>
             </a:fld>
           </a:p>
@@ -4480,7 +4480,7 @@
         <p:txBody>
           <a:bodyPr/>
           <a:p>
-            <a:fld id="{0C59DCDE-B251-4C89-A84A-D248E496698E}" type="slidenum">
+            <a:fld id="{0053D5CF-CD4A-482C-9FD7-43C30097AA84}" type="slidenum">
               <a:t>&lt;#&gt;</a:t>
             </a:fld>
           </a:p>
@@ -4707,7 +4707,7 @@
         <p:txBody>
           <a:bodyPr/>
           <a:p>
-            <a:fld id="{28FEDD7F-347B-49EB-A141-8B069BB22FBA}" type="slidenum">
+            <a:fld id="{A9AC7581-8A6F-4A30-9198-E27C99623956}" type="slidenum">
               <a:t>&lt;#&gt;</a:t>
             </a:fld>
           </a:p>
@@ -5008,7 +5008,7 @@
         <p:txBody>
           <a:bodyPr/>
           <a:p>
-            <a:fld id="{485214EE-B471-44E3-A866-2498C996670D}" type="slidenum">
+            <a:fld id="{985E6B12-A79D-4EC9-991D-FF2E0BE82EE2}" type="slidenum">
               <a:t>&lt;#&gt;</a:t>
             </a:fld>
           </a:p>
@@ -5181,7 +5181,7 @@
         <p:txBody>
           <a:bodyPr/>
           <a:p>
-            <a:fld id="{96E22354-8157-4D8D-B0C4-39DE8C5E881F}" type="slidenum">
+            <a:fld id="{EBC049A6-E2DD-4B91-B3A6-391CC7C92F29}" type="slidenum">
               <a:t>&lt;#&gt;</a:t>
             </a:fld>
           </a:p>
@@ -5280,7 +5280,7 @@
         <p:txBody>
           <a:bodyPr/>
           <a:p>
-            <a:fld id="{50994E18-FA1D-48A6-A2E4-F5DE92E83ECF}" type="slidenum">
+            <a:fld id="{92CB3558-CBA7-4DB1-AF81-2C73C6ABC058}" type="slidenum">
               <a:t>&lt;#&gt;</a:t>
             </a:fld>
           </a:p>
@@ -5379,7 +5379,7 @@
         <p:txBody>
           <a:bodyPr/>
           <a:p>
-            <a:fld id="{887EE0A3-ADD2-4AEB-9C28-9DDB42064257}" type="slidenum">
+            <a:fld id="{6B8C0103-6A8F-4A95-BE0A-881B6FD37429}" type="slidenum">
               <a:t>&lt;#&gt;</a:t>
             </a:fld>
           </a:p>
@@ -5589,7 +5589,7 @@
         <p:txBody>
           <a:bodyPr/>
           <a:p>
-            <a:fld id="{BB9E8430-2A41-490B-B981-4ECE96ED375E}" type="slidenum">
+            <a:fld id="{CECC2A81-2503-4AA6-A4D3-1961A3EE033C}" type="slidenum">
               <a:t>&lt;#&gt;</a:t>
             </a:fld>
           </a:p>
@@ -5799,7 +5799,7 @@
         <p:txBody>
           <a:bodyPr/>
           <a:p>
-            <a:fld id="{32122956-71A0-46E6-8850-707362FD36D3}" type="slidenum">
+            <a:fld id="{9CAF535A-1731-4C20-A031-9872BEDA717D}" type="slidenum">
               <a:t>&lt;#&gt;</a:t>
             </a:fld>
           </a:p>
@@ -6009,7 +6009,7 @@
         <p:txBody>
           <a:bodyPr/>
           <a:p>
-            <a:fld id="{9DE8C5E5-3742-476A-9518-0F8886D4623E}" type="slidenum">
+            <a:fld id="{5E0E14F3-A646-4E58-A35E-279A851C8605}" type="slidenum">
               <a:t>&lt;#&gt;</a:t>
             </a:fld>
           </a:p>
@@ -7617,7 +7617,7 @@
                 <a:tab algn="l" pos="0"/>
               </a:tabLst>
             </a:pPr>
-            <a:fld id="{57D46E8C-71A3-44A8-83C1-EB98E2D81948}" type="slidenum">
+            <a:fld id="{F87DF1CF-0B11-4E59-AEBC-5F315EAA14A6}" type="slidenum">
               <a:rPr b="0" lang="en-GB" sz="1500" spc="-1" strike="noStrike">
                 <a:solidFill>
                   <a:srgbClr val="ffffff"/>

</xml_diff>